<commit_message>
Fix publish scripts, update ppt
</commit_message>
<xml_diff>
--- a/Docker Swarm.pptx
+++ b/Docker Swarm.pptx
@@ -7,10 +7,10 @@
     <p:sldMasterId id="2147483663" r:id="rId3"/>
   </p:sldMasterIdLst>
   <p:notesMasterIdLst>
-    <p:notesMasterId r:id="rId38"/>
+    <p:notesMasterId r:id="rId39"/>
   </p:notesMasterIdLst>
   <p:handoutMasterIdLst>
-    <p:handoutMasterId r:id="rId39"/>
+    <p:handoutMasterId r:id="rId40"/>
   </p:handoutMasterIdLst>
   <p:sldIdLst>
     <p:sldId id="256" r:id="rId4"/>
@@ -35,18 +35,19 @@
     <p:sldId id="294" r:id="rId23"/>
     <p:sldId id="295" r:id="rId24"/>
     <p:sldId id="297" r:id="rId25"/>
-    <p:sldId id="296" r:id="rId26"/>
-    <p:sldId id="299" r:id="rId27"/>
-    <p:sldId id="300" r:id="rId28"/>
-    <p:sldId id="301" r:id="rId29"/>
-    <p:sldId id="303" r:id="rId30"/>
-    <p:sldId id="305" r:id="rId31"/>
-    <p:sldId id="306" r:id="rId32"/>
-    <p:sldId id="307" r:id="rId33"/>
-    <p:sldId id="308" r:id="rId34"/>
-    <p:sldId id="309" r:id="rId35"/>
-    <p:sldId id="311" r:id="rId36"/>
-    <p:sldId id="312" r:id="rId37"/>
+    <p:sldId id="313" r:id="rId26"/>
+    <p:sldId id="296" r:id="rId27"/>
+    <p:sldId id="299" r:id="rId28"/>
+    <p:sldId id="300" r:id="rId29"/>
+    <p:sldId id="301" r:id="rId30"/>
+    <p:sldId id="303" r:id="rId31"/>
+    <p:sldId id="305" r:id="rId32"/>
+    <p:sldId id="306" r:id="rId33"/>
+    <p:sldId id="307" r:id="rId34"/>
+    <p:sldId id="308" r:id="rId35"/>
+    <p:sldId id="309" r:id="rId36"/>
+    <p:sldId id="311" r:id="rId37"/>
+    <p:sldId id="312" r:id="rId38"/>
   </p:sldIdLst>
   <p:sldSz cx="9144000" cy="5143500" type="screen16x9"/>
   <p:notesSz cx="6858000" cy="9144000"/>
@@ -24409,10 +24410,10 @@
       </p:grpSpPr>
       <p:sp>
         <p:nvSpPr>
-          <p:cNvPr id="3" name="Title 2">
+          <p:cNvPr id="5" name="Slide Number Placeholder 4">
             <a:extLst>
               <a:ext uri="{FF2B5EF4-FFF2-40B4-BE49-F238E27FC236}">
-                <a16:creationId xmlns:a16="http://schemas.microsoft.com/office/drawing/2014/main" id="{8230FDC5-EC4F-9D4D-904E-A758FE2F929A}"/>
+                <a16:creationId xmlns:a16="http://schemas.microsoft.com/office/drawing/2014/main" id="{DA565E9D-FFF5-43F5-8F33-2D28ADC67844}"/>
               </a:ext>
             </a:extLst>
           </p:cNvPr>
@@ -24420,78 +24421,10 @@
             <a:spLocks noGrp="1"/>
           </p:cNvSpPr>
           <p:nvPr>
-            <p:ph type="title"/>
+            <p:ph type="sldNum" sz="quarter" idx="4"/>
           </p:nvPr>
         </p:nvSpPr>
-        <p:spPr>
-          <a:xfrm>
-            <a:off x="680612" y="1961659"/>
-            <a:ext cx="7782776" cy="1220182"/>
-          </a:xfrm>
-          <a:noFill/>
-          <a:ln>
-            <a:noFill/>
-          </a:ln>
-        </p:spPr>
-        <p:style>
-          <a:lnRef idx="0">
-            <a:scrgbClr r="0" g="0" b="0"/>
-          </a:lnRef>
-          <a:fillRef idx="0">
-            <a:scrgbClr r="0" g="0" b="0"/>
-          </a:fillRef>
-          <a:effectRef idx="0">
-            <a:scrgbClr r="0" g="0" b="0"/>
-          </a:effectRef>
-          <a:fontRef idx="minor">
-            <a:schemeClr val="accent6"/>
-          </a:fontRef>
-        </p:style>
-        <p:txBody>
-          <a:bodyPr/>
-          <a:lstStyle/>
-          <a:p>
-            <a:r>
-              <a:rPr lang="en-US" sz="4000" dirty="0" err="1">
-                <a:solidFill>
-                  <a:schemeClr val="bg1"/>
-                </a:solidFill>
-              </a:rPr>
-              <a:t>Dockerfile</a:t>
-            </a:r>
-            <a:endParaRPr lang="en-US" sz="4000" dirty="0">
-              <a:solidFill>
-                <a:schemeClr val="bg1"/>
-              </a:solidFill>
-            </a:endParaRPr>
-          </a:p>
-        </p:txBody>
-      </p:sp>
-      <p:sp>
-        <p:nvSpPr>
-          <p:cNvPr id="2" name="Slide Number Placeholder 1">
-            <a:extLst>
-              <a:ext uri="{FF2B5EF4-FFF2-40B4-BE49-F238E27FC236}">
-                <a16:creationId xmlns:a16="http://schemas.microsoft.com/office/drawing/2014/main" id="{BD2203D6-46B2-544A-AEDD-86624A2E7DA7}"/>
-              </a:ext>
-            </a:extLst>
-          </p:cNvPr>
-          <p:cNvSpPr>
-            <a:spLocks noGrp="1"/>
-          </p:cNvSpPr>
-          <p:nvPr>
-            <p:ph type="sldNum" sz="quarter" idx="4294967295"/>
-          </p:nvPr>
-        </p:nvSpPr>
-        <p:spPr>
-          <a:xfrm>
-            <a:off x="7770813" y="4826000"/>
-            <a:ext cx="1373187" cy="317500"/>
-          </a:xfrm>
-          <a:prstGeom prst="rect">
-            <a:avLst/>
-          </a:prstGeom>
-        </p:spPr>
+        <p:spPr/>
         <p:txBody>
           <a:bodyPr/>
           <a:lstStyle/>
@@ -24505,10 +24438,57 @@
           </a:p>
         </p:txBody>
       </p:sp>
+      <p:pic>
+        <p:nvPicPr>
+          <p:cNvPr id="15362" name="Picture 2">
+            <a:extLst>
+              <a:ext uri="{FF2B5EF4-FFF2-40B4-BE49-F238E27FC236}">
+                <a16:creationId xmlns:a16="http://schemas.microsoft.com/office/drawing/2014/main" id="{9F1AADEB-F6E1-429E-BF74-8B4812F4FDD7}"/>
+              </a:ext>
+            </a:extLst>
+          </p:cNvPr>
+          <p:cNvPicPr>
+            <a:picLocks noChangeAspect="1" noChangeArrowheads="1"/>
+          </p:cNvPicPr>
+          <p:nvPr/>
+        </p:nvPicPr>
+        <p:blipFill>
+          <a:blip r:embed="rId2">
+            <a:extLst>
+              <a:ext uri="{28A0092B-C50C-407E-A947-70E740481C1C}">
+                <a14:useLocalDpi xmlns:a14="http://schemas.microsoft.com/office/drawing/2010/main" val="0"/>
+              </a:ext>
+            </a:extLst>
+          </a:blip>
+          <a:srcRect/>
+          <a:stretch>
+            <a:fillRect/>
+          </a:stretch>
+        </p:blipFill>
+        <p:spPr bwMode="auto">
+          <a:xfrm>
+            <a:off x="506895" y="0"/>
+            <a:ext cx="8130209" cy="4784967"/>
+          </a:xfrm>
+          <a:prstGeom prst="rect">
+            <a:avLst/>
+          </a:prstGeom>
+          <a:noFill/>
+          <a:extLst>
+            <a:ext uri="{909E8E84-426E-40DD-AFC4-6F175D3DCCD1}">
+              <a14:hiddenFill xmlns:a14="http://schemas.microsoft.com/office/drawing/2010/main">
+                <a:solidFill>
+                  <a:srgbClr val="FFFFFF"/>
+                </a:solidFill>
+              </a14:hiddenFill>
+            </a:ext>
+          </a:extLst>
+        </p:spPr>
+      </p:pic>
     </p:spTree>
     <p:extLst>
       <p:ext uri="{BB962C8B-B14F-4D97-AF65-F5344CB8AC3E}">
-        <p14:creationId xmlns:p14="http://schemas.microsoft.com/office/powerpoint/2010/main" val="3153058041"/>
+        <p14:creationId xmlns:p14="http://schemas.microsoft.com/office/powerpoint/2010/main" val="773131488"/>
       </p:ext>
     </p:extLst>
   </p:cSld>
@@ -24580,13 +24560,18 @@
           <a:lstStyle/>
           <a:p>
             <a:r>
-              <a:rPr lang="en-US" sz="4000" dirty="0">
+              <a:rPr lang="en-US" sz="4000" dirty="0" err="1">
                 <a:solidFill>
                   <a:schemeClr val="bg1"/>
                 </a:solidFill>
               </a:rPr>
-              <a:t>Rolling Updates</a:t>
-            </a:r>
+              <a:t>Dockerfile</a:t>
+            </a:r>
+            <a:endParaRPr lang="en-US" sz="4000" dirty="0">
+              <a:solidFill>
+                <a:schemeClr val="bg1"/>
+              </a:solidFill>
+            </a:endParaRPr>
           </a:p>
         </p:txBody>
       </p:sp>
@@ -24631,7 +24616,7 @@
     </p:spTree>
     <p:extLst>
       <p:ext uri="{BB962C8B-B14F-4D97-AF65-F5344CB8AC3E}">
-        <p14:creationId xmlns:p14="http://schemas.microsoft.com/office/powerpoint/2010/main" val="2525459694"/>
+        <p14:creationId xmlns:p14="http://schemas.microsoft.com/office/powerpoint/2010/main" val="3153058041"/>
       </p:ext>
     </p:extLst>
   </p:cSld>
@@ -24708,7 +24693,7 @@
                   <a:schemeClr val="bg1"/>
                 </a:solidFill>
               </a:rPr>
-              <a:t>Docker Secret</a:t>
+              <a:t>Rolling Updates</a:t>
             </a:r>
           </a:p>
         </p:txBody>
@@ -24754,7 +24739,7 @@
     </p:spTree>
     <p:extLst>
       <p:ext uri="{BB962C8B-B14F-4D97-AF65-F5344CB8AC3E}">
-        <p14:creationId xmlns:p14="http://schemas.microsoft.com/office/powerpoint/2010/main" val="1882116675"/>
+        <p14:creationId xmlns:p14="http://schemas.microsoft.com/office/powerpoint/2010/main" val="2525459694"/>
       </p:ext>
     </p:extLst>
   </p:cSld>
@@ -24831,7 +24816,22 @@
                   <a:schemeClr val="bg1"/>
                 </a:solidFill>
               </a:rPr>
-              <a:t>Docker System?</a:t>
+              <a:t>Docker Secrets, </a:t>
+            </a:r>
+            <a:br>
+              <a:rPr lang="en-US" sz="4000" dirty="0">
+                <a:solidFill>
+                  <a:schemeClr val="bg1"/>
+                </a:solidFill>
+              </a:rPr>
+            </a:br>
+            <a:r>
+              <a:rPr lang="en-US" sz="4000" dirty="0">
+                <a:solidFill>
+                  <a:schemeClr val="bg1"/>
+                </a:solidFill>
+              </a:rPr>
+              <a:t>service-Configs</a:t>
             </a:r>
           </a:p>
         </p:txBody>
@@ -24877,7 +24877,7 @@
     </p:spTree>
     <p:extLst>
       <p:ext uri="{BB962C8B-B14F-4D97-AF65-F5344CB8AC3E}">
-        <p14:creationId xmlns:p14="http://schemas.microsoft.com/office/powerpoint/2010/main" val="1434303126"/>
+        <p14:creationId xmlns:p14="http://schemas.microsoft.com/office/powerpoint/2010/main" val="1882116675"/>
       </p:ext>
     </p:extLst>
   </p:cSld>
@@ -24954,21 +24954,8 @@
                   <a:schemeClr val="bg1"/>
                 </a:solidFill>
               </a:rPr>
-              <a:t>What now</a:t>
-            </a:r>
-            <a:r>
-              <a:rPr lang="en-AS" sz="4000" dirty="0">
-                <a:solidFill>
-                  <a:schemeClr val="bg1"/>
-                </a:solidFill>
-              </a:rPr>
-              <a:t>?</a:t>
-            </a:r>
-            <a:endParaRPr lang="en-US" sz="4000" dirty="0">
-              <a:solidFill>
-                <a:schemeClr val="bg1"/>
-              </a:solidFill>
-            </a:endParaRPr>
+              <a:t>Docker System?</a:t>
+            </a:r>
           </a:p>
         </p:txBody>
       </p:sp>
@@ -25013,7 +25000,7 @@
     </p:spTree>
     <p:extLst>
       <p:ext uri="{BB962C8B-B14F-4D97-AF65-F5344CB8AC3E}">
-        <p14:creationId xmlns:p14="http://schemas.microsoft.com/office/powerpoint/2010/main" val="3694667410"/>
+        <p14:creationId xmlns:p14="http://schemas.microsoft.com/office/powerpoint/2010/main" val="1434303126"/>
       </p:ext>
     </p:extLst>
   </p:cSld>
@@ -25149,7 +25136,7 @@
     </p:spTree>
     <p:extLst>
       <p:ext uri="{BB962C8B-B14F-4D97-AF65-F5344CB8AC3E}">
-        <p14:creationId xmlns:p14="http://schemas.microsoft.com/office/powerpoint/2010/main" val="3112025315"/>
+        <p14:creationId xmlns:p14="http://schemas.microsoft.com/office/powerpoint/2010/main" val="3694667410"/>
       </p:ext>
     </p:extLst>
   </p:cSld>
@@ -25178,10 +25165,10 @@
       </p:grpSpPr>
       <p:sp>
         <p:nvSpPr>
-          <p:cNvPr id="6" name="Title 5">
+          <p:cNvPr id="3" name="Title 2">
             <a:extLst>
               <a:ext uri="{FF2B5EF4-FFF2-40B4-BE49-F238E27FC236}">
-                <a16:creationId xmlns:a16="http://schemas.microsoft.com/office/drawing/2014/main" id="{C1E31384-3A69-F844-B4E8-8047057EAEC8}"/>
+                <a16:creationId xmlns:a16="http://schemas.microsoft.com/office/drawing/2014/main" id="{8230FDC5-EC4F-9D4D-904E-A758FE2F929A}"/>
               </a:ext>
             </a:extLst>
           </p:cNvPr>
@@ -25192,73 +25179,64 @@
             <p:ph type="title"/>
           </p:nvPr>
         </p:nvSpPr>
-        <p:spPr/>
+        <p:spPr>
+          <a:xfrm>
+            <a:off x="680612" y="1961659"/>
+            <a:ext cx="7782776" cy="1220182"/>
+          </a:xfrm>
+          <a:noFill/>
+          <a:ln>
+            <a:noFill/>
+          </a:ln>
+        </p:spPr>
+        <p:style>
+          <a:lnRef idx="0">
+            <a:scrgbClr r="0" g="0" b="0"/>
+          </a:lnRef>
+          <a:fillRef idx="0">
+            <a:scrgbClr r="0" g="0" b="0"/>
+          </a:fillRef>
+          <a:effectRef idx="0">
+            <a:scrgbClr r="0" g="0" b="0"/>
+          </a:effectRef>
+          <a:fontRef idx="minor">
+            <a:schemeClr val="accent6"/>
+          </a:fontRef>
+        </p:style>
         <p:txBody>
           <a:bodyPr/>
           <a:lstStyle/>
           <a:p>
             <a:r>
-              <a:rPr lang="en-AS" sz="2400" b="1" dirty="0">
-                <a:latin typeface="Source Sans Pro" panose="020B0503030403020204" pitchFamily="34" charset="0"/>
-                <a:ea typeface="Source Sans Pro" panose="020B0503030403020204" pitchFamily="34" charset="0"/>
-              </a:rPr>
-              <a:t>M</a:t>
-            </a:r>
-            <a:r>
-              <a:rPr lang="en-US" sz="2400" b="1" dirty="0">
-                <a:latin typeface="Source Sans Pro" panose="020B0503030403020204" pitchFamily="34" charset="0"/>
-                <a:ea typeface="Source Sans Pro" panose="020B0503030403020204" pitchFamily="34" charset="0"/>
-              </a:rPr>
-              <a:t>e</a:t>
-            </a:r>
-            <a:r>
-              <a:rPr lang="en-AS" sz="2400" b="1" dirty="0">
-                <a:latin typeface="Source Sans Pro" panose="020B0503030403020204" pitchFamily="34" charset="0"/>
-                <a:ea typeface="Source Sans Pro" panose="020B0503030403020204" pitchFamily="34" charset="0"/>
-              </a:rPr>
-              <a:t>t</a:t>
-            </a:r>
-            <a:r>
-              <a:rPr lang="en-US" sz="2400" b="1" dirty="0">
-                <a:latin typeface="Source Sans Pro" panose="020B0503030403020204" pitchFamily="34" charset="0"/>
-                <a:ea typeface="Source Sans Pro" panose="020B0503030403020204" pitchFamily="34" charset="0"/>
-              </a:rPr>
-              <a:t>r</a:t>
-            </a:r>
-            <a:r>
-              <a:rPr lang="en-AS" sz="2400" b="1" dirty="0" err="1">
-                <a:latin typeface="Source Sans Pro" panose="020B0503030403020204" pitchFamily="34" charset="0"/>
-                <a:ea typeface="Source Sans Pro" panose="020B0503030403020204" pitchFamily="34" charset="0"/>
-              </a:rPr>
-              <a:t>i</a:t>
-            </a:r>
-            <a:r>
-              <a:rPr lang="en-US" sz="2400" b="1" dirty="0">
-                <a:latin typeface="Source Sans Pro" panose="020B0503030403020204" pitchFamily="34" charset="0"/>
-                <a:ea typeface="Source Sans Pro" panose="020B0503030403020204" pitchFamily="34" charset="0"/>
-              </a:rPr>
-              <a:t>c</a:t>
-            </a:r>
-            <a:r>
-              <a:rPr lang="en-AS" sz="2400" b="1" dirty="0">
-                <a:latin typeface="Source Sans Pro" panose="020B0503030403020204" pitchFamily="34" charset="0"/>
-                <a:ea typeface="Source Sans Pro" panose="020B0503030403020204" pitchFamily="34" charset="0"/>
-              </a:rPr>
-              <a:t>s</a:t>
-            </a:r>
-            <a:endParaRPr lang="en-US" sz="2400" b="1" dirty="0">
-              <a:latin typeface="Source Sans Pro" panose="020B0503030403020204" pitchFamily="34" charset="0"/>
-              <a:ea typeface="Source Sans Pro" panose="020B0503030403020204" pitchFamily="34" charset="0"/>
+              <a:rPr lang="en-US" sz="4000" dirty="0">
+                <a:solidFill>
+                  <a:schemeClr val="bg1"/>
+                </a:solidFill>
+              </a:rPr>
+              <a:t>What now</a:t>
+            </a:r>
+            <a:r>
+              <a:rPr lang="en-AS" sz="4000" dirty="0">
+                <a:solidFill>
+                  <a:schemeClr val="bg1"/>
+                </a:solidFill>
+              </a:rPr>
+              <a:t>?</a:t>
+            </a:r>
+            <a:endParaRPr lang="en-US" sz="4000" dirty="0">
+              <a:solidFill>
+                <a:schemeClr val="bg1"/>
+              </a:solidFill>
             </a:endParaRPr>
           </a:p>
         </p:txBody>
       </p:sp>
       <p:sp>
         <p:nvSpPr>
-          <p:cNvPr id="5" name="Slide Number Placeholder 4">
+          <p:cNvPr id="2" name="Slide Number Placeholder 1">
             <a:extLst>
               <a:ext uri="{FF2B5EF4-FFF2-40B4-BE49-F238E27FC236}">
-                <a16:creationId xmlns:a16="http://schemas.microsoft.com/office/drawing/2014/main" id="{D695E08B-236F-5B4F-801C-4C75369E005C}"/>
+                <a16:creationId xmlns:a16="http://schemas.microsoft.com/office/drawing/2014/main" id="{BD2203D6-46B2-544A-AEDD-86624A2E7DA7}"/>
               </a:ext>
             </a:extLst>
           </p:cNvPr>
@@ -25266,10 +25244,18 @@
             <a:spLocks noGrp="1"/>
           </p:cNvSpPr>
           <p:nvPr>
-            <p:ph type="sldNum" sz="quarter" idx="4"/>
+            <p:ph type="sldNum" sz="quarter" idx="4294967295"/>
           </p:nvPr>
         </p:nvSpPr>
-        <p:spPr/>
+        <p:spPr>
+          <a:xfrm>
+            <a:off x="7770813" y="4826000"/>
+            <a:ext cx="1373187" cy="317500"/>
+          </a:xfrm>
+          <a:prstGeom prst="rect">
+            <a:avLst/>
+          </a:prstGeom>
+        </p:spPr>
         <p:txBody>
           <a:bodyPr/>
           <a:lstStyle/>
@@ -25283,277 +25269,10 @@
           </a:p>
         </p:txBody>
       </p:sp>
-      <p:sp>
-        <p:nvSpPr>
-          <p:cNvPr id="10" name="Content Placeholder 2">
-            <a:extLst>
-              <a:ext uri="{FF2B5EF4-FFF2-40B4-BE49-F238E27FC236}">
-                <a16:creationId xmlns:a16="http://schemas.microsoft.com/office/drawing/2014/main" id="{5D0C82FB-7C2C-47FB-8BCD-E5CDCDE9FC17}"/>
-              </a:ext>
-            </a:extLst>
-          </p:cNvPr>
-          <p:cNvSpPr txBox="1">
-            <a:spLocks/>
-          </p:cNvSpPr>
-          <p:nvPr/>
-        </p:nvSpPr>
-        <p:spPr>
-          <a:xfrm>
-            <a:off x="261400" y="822324"/>
-            <a:ext cx="8733587" cy="3801115"/>
-          </a:xfrm>
-          <a:prstGeom prst="rect">
-            <a:avLst/>
-          </a:prstGeom>
-        </p:spPr>
-        <p:txBody>
-          <a:bodyPr vert="horz" lIns="0" tIns="0" rIns="0" bIns="0" rtlCol="0">
-            <a:noAutofit/>
-          </a:bodyPr>
-          <a:lstStyle>
-            <a:lvl1pPr marL="171450" marR="0" indent="-171450" algn="l" defTabSz="914400" rtl="0" eaLnBrk="1" fontAlgn="auto" latinLnBrk="0" hangingPunct="1">
-              <a:lnSpc>
-                <a:spcPts val="1600"/>
-              </a:lnSpc>
-              <a:spcBef>
-                <a:spcPts val="264"/>
-              </a:spcBef>
-              <a:spcAft>
-                <a:spcPts val="300"/>
-              </a:spcAft>
-              <a:buClrTx/>
-              <a:buSzTx/>
-              <a:buFont typeface="Arial" panose="020B0604020202020204" pitchFamily="34" charset="0"/>
-              <a:buChar char="•"/>
-              <a:tabLst/>
-              <a:defRPr sz="1100" kern="1200">
-                <a:solidFill>
-                  <a:schemeClr val="tx1"/>
-                </a:solidFill>
-                <a:latin typeface="+mj-lt"/>
-                <a:ea typeface="+mn-ea"/>
-                <a:cs typeface="+mn-cs"/>
-              </a:defRPr>
-            </a:lvl1pPr>
-            <a:lvl2pPr marL="628650" indent="-171450" algn="l" defTabSz="914400" rtl="0" eaLnBrk="1" latinLnBrk="0" hangingPunct="1">
-              <a:lnSpc>
-                <a:spcPct val="90000"/>
-              </a:lnSpc>
-              <a:spcBef>
-                <a:spcPts val="500"/>
-              </a:spcBef>
-              <a:buFont typeface="Arial" panose="020B0604020202020204" pitchFamily="34" charset="0"/>
-              <a:buChar char="•"/>
-              <a:defRPr sz="1100" kern="1200">
-                <a:solidFill>
-                  <a:schemeClr val="tx1"/>
-                </a:solidFill>
-                <a:latin typeface="+mn-lt"/>
-                <a:ea typeface="+mn-ea"/>
-                <a:cs typeface="+mn-cs"/>
-              </a:defRPr>
-            </a:lvl2pPr>
-            <a:lvl3pPr marL="1085850" indent="-171450" algn="l" defTabSz="914400" rtl="0" eaLnBrk="1" latinLnBrk="0" hangingPunct="1">
-              <a:lnSpc>
-                <a:spcPct val="90000"/>
-              </a:lnSpc>
-              <a:spcBef>
-                <a:spcPts val="500"/>
-              </a:spcBef>
-              <a:buFont typeface="Arial" panose="020B0604020202020204" pitchFamily="34" charset="0"/>
-              <a:buChar char="•"/>
-              <a:defRPr sz="1100" kern="1200">
-                <a:solidFill>
-                  <a:schemeClr val="tx1"/>
-                </a:solidFill>
-                <a:latin typeface="+mn-lt"/>
-                <a:ea typeface="+mn-ea"/>
-                <a:cs typeface="+mn-cs"/>
-              </a:defRPr>
-            </a:lvl3pPr>
-            <a:lvl4pPr marL="1657350" indent="-285750" algn="l" defTabSz="914400" rtl="0" eaLnBrk="1" latinLnBrk="0" hangingPunct="1">
-              <a:lnSpc>
-                <a:spcPct val="90000"/>
-              </a:lnSpc>
-              <a:spcBef>
-                <a:spcPts val="500"/>
-              </a:spcBef>
-              <a:buFont typeface="Arial" panose="020B0604020202020204" pitchFamily="34" charset="0"/>
-              <a:buChar char="•"/>
-              <a:defRPr sz="1100" kern="1200">
-                <a:solidFill>
-                  <a:schemeClr val="tx1"/>
-                </a:solidFill>
-                <a:latin typeface="+mn-lt"/>
-                <a:ea typeface="+mn-ea"/>
-                <a:cs typeface="+mn-cs"/>
-              </a:defRPr>
-            </a:lvl4pPr>
-            <a:lvl5pPr marL="1828800" indent="0" algn="l" defTabSz="914400" rtl="0" eaLnBrk="1" latinLnBrk="0" hangingPunct="1">
-              <a:lnSpc>
-                <a:spcPct val="90000"/>
-              </a:lnSpc>
-              <a:spcBef>
-                <a:spcPts val="500"/>
-              </a:spcBef>
-              <a:buFont typeface="Arial" panose="020B0604020202020204" pitchFamily="34" charset="0"/>
-              <a:buNone/>
-              <a:defRPr sz="1800" kern="1200">
-                <a:solidFill>
-                  <a:schemeClr val="tx1"/>
-                </a:solidFill>
-                <a:latin typeface="+mn-lt"/>
-                <a:ea typeface="+mn-ea"/>
-                <a:cs typeface="+mn-cs"/>
-              </a:defRPr>
-            </a:lvl5pPr>
-            <a:lvl6pPr marL="2514600" indent="-228600" algn="l" defTabSz="914400" rtl="0" eaLnBrk="1" latinLnBrk="0" hangingPunct="1">
-              <a:lnSpc>
-                <a:spcPct val="90000"/>
-              </a:lnSpc>
-              <a:spcBef>
-                <a:spcPts val="500"/>
-              </a:spcBef>
-              <a:buFont typeface="Arial" panose="020B0604020202020204" pitchFamily="34" charset="0"/>
-              <a:buChar char="•"/>
-              <a:defRPr sz="1800" kern="1200">
-                <a:solidFill>
-                  <a:schemeClr val="tx1"/>
-                </a:solidFill>
-                <a:latin typeface="+mn-lt"/>
-                <a:ea typeface="+mn-ea"/>
-                <a:cs typeface="+mn-cs"/>
-              </a:defRPr>
-            </a:lvl6pPr>
-            <a:lvl7pPr marL="2971800" indent="-228600" algn="l" defTabSz="914400" rtl="0" eaLnBrk="1" latinLnBrk="0" hangingPunct="1">
-              <a:lnSpc>
-                <a:spcPct val="90000"/>
-              </a:lnSpc>
-              <a:spcBef>
-                <a:spcPts val="500"/>
-              </a:spcBef>
-              <a:buFont typeface="Arial" panose="020B0604020202020204" pitchFamily="34" charset="0"/>
-              <a:buChar char="•"/>
-              <a:defRPr sz="1800" kern="1200">
-                <a:solidFill>
-                  <a:schemeClr val="tx1"/>
-                </a:solidFill>
-                <a:latin typeface="+mn-lt"/>
-                <a:ea typeface="+mn-ea"/>
-                <a:cs typeface="+mn-cs"/>
-              </a:defRPr>
-            </a:lvl7pPr>
-            <a:lvl8pPr marL="3429000" indent="-228600" algn="l" defTabSz="914400" rtl="0" eaLnBrk="1" latinLnBrk="0" hangingPunct="1">
-              <a:lnSpc>
-                <a:spcPct val="90000"/>
-              </a:lnSpc>
-              <a:spcBef>
-                <a:spcPts val="500"/>
-              </a:spcBef>
-              <a:buFont typeface="Arial" panose="020B0604020202020204" pitchFamily="34" charset="0"/>
-              <a:buChar char="•"/>
-              <a:defRPr sz="1800" kern="1200">
-                <a:solidFill>
-                  <a:schemeClr val="tx1"/>
-                </a:solidFill>
-                <a:latin typeface="+mn-lt"/>
-                <a:ea typeface="+mn-ea"/>
-                <a:cs typeface="+mn-cs"/>
-              </a:defRPr>
-            </a:lvl8pPr>
-            <a:lvl9pPr marL="3886200" indent="-228600" algn="l" defTabSz="914400" rtl="0" eaLnBrk="1" latinLnBrk="0" hangingPunct="1">
-              <a:lnSpc>
-                <a:spcPct val="90000"/>
-              </a:lnSpc>
-              <a:spcBef>
-                <a:spcPts val="500"/>
-              </a:spcBef>
-              <a:buFont typeface="Arial" panose="020B0604020202020204" pitchFamily="34" charset="0"/>
-              <a:buChar char="•"/>
-              <a:defRPr sz="1800" kern="1200">
-                <a:solidFill>
-                  <a:schemeClr val="tx1"/>
-                </a:solidFill>
-                <a:latin typeface="+mn-lt"/>
-                <a:ea typeface="+mn-ea"/>
-                <a:cs typeface="+mn-cs"/>
-              </a:defRPr>
-            </a:lvl9pPr>
-          </a:lstStyle>
-          <a:p>
-            <a:pPr>
-              <a:lnSpc>
-                <a:spcPct val="100000"/>
-              </a:lnSpc>
-            </a:pPr>
-            <a:endParaRPr lang="en-AS" sz="2000" dirty="0"/>
-          </a:p>
-          <a:p>
-            <a:pPr>
-              <a:lnSpc>
-                <a:spcPct val="100000"/>
-              </a:lnSpc>
-              <a:buFont typeface="Wingdings" panose="05000000000000000000" pitchFamily="2" charset="2"/>
-              <a:buChar char="§"/>
-            </a:pPr>
-            <a:r>
-              <a:rPr lang="en-US" sz="2000" dirty="0"/>
-              <a:t>Prometheus </a:t>
-            </a:r>
-            <a:endParaRPr lang="en-AS" sz="2000" dirty="0"/>
-          </a:p>
-          <a:p>
-            <a:pPr>
-              <a:lnSpc>
-                <a:spcPct val="100000"/>
-              </a:lnSpc>
-              <a:buFont typeface="Wingdings" panose="05000000000000000000" pitchFamily="2" charset="2"/>
-              <a:buChar char="§"/>
-            </a:pPr>
-            <a:r>
-              <a:rPr lang="en-US" sz="2000" dirty="0" err="1"/>
-              <a:t>cAdvisor</a:t>
-            </a:r>
-            <a:r>
-              <a:rPr lang="en-US" sz="2000" dirty="0"/>
-              <a:t> </a:t>
-            </a:r>
-            <a:endParaRPr lang="en-AS" sz="2000" dirty="0"/>
-          </a:p>
-          <a:p>
-            <a:pPr>
-              <a:lnSpc>
-                <a:spcPct val="100000"/>
-              </a:lnSpc>
-              <a:buFont typeface="Wingdings" panose="05000000000000000000" pitchFamily="2" charset="2"/>
-              <a:buChar char="§"/>
-            </a:pPr>
-            <a:r>
-              <a:rPr lang="en-US" sz="2000" dirty="0" err="1"/>
-              <a:t>InfluxDB</a:t>
-            </a:r>
-            <a:endParaRPr lang="en-AS" sz="2000" dirty="0"/>
-          </a:p>
-          <a:p>
-            <a:pPr>
-              <a:lnSpc>
-                <a:spcPct val="100000"/>
-              </a:lnSpc>
-              <a:buFont typeface="Wingdings" panose="05000000000000000000" pitchFamily="2" charset="2"/>
-              <a:buChar char="§"/>
-            </a:pPr>
-            <a:r>
-              <a:rPr lang="en-AS" sz="2000" dirty="0"/>
-              <a:t>etc.</a:t>
-            </a:r>
-            <a:endParaRPr lang="en-US" sz="2000" dirty="0"/>
-          </a:p>
-        </p:txBody>
-      </p:sp>
     </p:spTree>
     <p:extLst>
       <p:ext uri="{BB962C8B-B14F-4D97-AF65-F5344CB8AC3E}">
-        <p14:creationId xmlns:p14="http://schemas.microsoft.com/office/powerpoint/2010/main" val="544975374"/>
+        <p14:creationId xmlns:p14="http://schemas.microsoft.com/office/powerpoint/2010/main" val="3112025315"/>
       </p:ext>
     </p:extLst>
   </p:cSld>
@@ -26060,54 +25779,58 @@
           <a:lstStyle/>
           <a:p>
             <a:r>
+              <a:rPr lang="en-AS" sz="2400" b="1" dirty="0">
+                <a:latin typeface="Source Sans Pro" panose="020B0503030403020204" pitchFamily="34" charset="0"/>
+                <a:ea typeface="Source Sans Pro" panose="020B0503030403020204" pitchFamily="34" charset="0"/>
+              </a:rPr>
+              <a:t>M</a:t>
+            </a:r>
+            <a:r>
               <a:rPr lang="en-US" sz="2400" b="1" dirty="0">
                 <a:latin typeface="Source Sans Pro" panose="020B0503030403020204" pitchFamily="34" charset="0"/>
                 <a:ea typeface="Source Sans Pro" panose="020B0503030403020204" pitchFamily="34" charset="0"/>
               </a:rPr>
-              <a:t>L</a:t>
+              <a:t>e</a:t>
             </a:r>
             <a:r>
               <a:rPr lang="en-AS" sz="2400" b="1" dirty="0">
                 <a:latin typeface="Source Sans Pro" panose="020B0503030403020204" pitchFamily="34" charset="0"/>
                 <a:ea typeface="Source Sans Pro" panose="020B0503030403020204" pitchFamily="34" charset="0"/>
               </a:rPr>
-              <a:t>o</a:t>
+              <a:t>t</a:t>
             </a:r>
             <a:r>
               <a:rPr lang="en-US" sz="2400" b="1" dirty="0">
                 <a:latin typeface="Source Sans Pro" panose="020B0503030403020204" pitchFamily="34" charset="0"/>
                 <a:ea typeface="Source Sans Pro" panose="020B0503030403020204" pitchFamily="34" charset="0"/>
               </a:rPr>
-              <a:t>g</a:t>
+              <a:t>r</a:t>
+            </a:r>
+            <a:r>
+              <a:rPr lang="en-AS" sz="2400" b="1" dirty="0" err="1">
+                <a:latin typeface="Source Sans Pro" panose="020B0503030403020204" pitchFamily="34" charset="0"/>
+                <a:ea typeface="Source Sans Pro" panose="020B0503030403020204" pitchFamily="34" charset="0"/>
+              </a:rPr>
+              <a:t>i</a:t>
+            </a:r>
+            <a:r>
+              <a:rPr lang="en-US" sz="2400" b="1" dirty="0">
+                <a:latin typeface="Source Sans Pro" panose="020B0503030403020204" pitchFamily="34" charset="0"/>
+                <a:ea typeface="Source Sans Pro" panose="020B0503030403020204" pitchFamily="34" charset="0"/>
+              </a:rPr>
+              <a:t>c</a:t>
             </a:r>
             <a:r>
               <a:rPr lang="en-AS" sz="2400" b="1" dirty="0">
                 <a:latin typeface="Source Sans Pro" panose="020B0503030403020204" pitchFamily="34" charset="0"/>
                 <a:ea typeface="Source Sans Pro" panose="020B0503030403020204" pitchFamily="34" charset="0"/>
               </a:rPr>
-              <a:t>g</a:t>
-            </a:r>
-            <a:r>
-              <a:rPr lang="en-US" sz="2400" b="1" dirty="0" err="1">
-                <a:latin typeface="Source Sans Pro" panose="020B0503030403020204" pitchFamily="34" charset="0"/>
-                <a:ea typeface="Source Sans Pro" panose="020B0503030403020204" pitchFamily="34" charset="0"/>
-              </a:rPr>
-              <a:t>i</a:t>
-            </a:r>
-            <a:r>
-              <a:rPr lang="en-AS" sz="2400" b="1" dirty="0">
-                <a:latin typeface="Source Sans Pro" panose="020B0503030403020204" pitchFamily="34" charset="0"/>
-                <a:ea typeface="Source Sans Pro" panose="020B0503030403020204" pitchFamily="34" charset="0"/>
-              </a:rPr>
-              <a:t>n</a:t>
-            </a:r>
-            <a:r>
-              <a:rPr lang="en-US" sz="2400" b="1" dirty="0">
-                <a:latin typeface="Source Sans Pro" panose="020B0503030403020204" pitchFamily="34" charset="0"/>
-                <a:ea typeface="Source Sans Pro" panose="020B0503030403020204" pitchFamily="34" charset="0"/>
-              </a:rPr>
-              <a:t>g</a:t>
-            </a:r>
+              <a:t>s</a:t>
+            </a:r>
+            <a:endParaRPr lang="en-US" sz="2400" b="1" dirty="0">
+              <a:latin typeface="Source Sans Pro" panose="020B0503030403020204" pitchFamily="34" charset="0"/>
+              <a:ea typeface="Source Sans Pro" panose="020B0503030403020204" pitchFamily="34" charset="0"/>
+            </a:endParaRPr>
           </a:p>
         </p:txBody>
       </p:sp>
@@ -26355,12 +26078,8 @@
               <a:buChar char="§"/>
             </a:pPr>
             <a:r>
-              <a:rPr lang="en-US" sz="2000" dirty="0" err="1"/>
-              <a:t>ElasticSearch</a:t>
-            </a:r>
-            <a:r>
               <a:rPr lang="en-US" sz="2000" dirty="0"/>
-              <a:t>, Kibana and Logstash (ELK) </a:t>
+              <a:t>Prometheus </a:t>
             </a:r>
             <a:endParaRPr lang="en-AS" sz="2000" dirty="0"/>
           </a:p>
@@ -26374,7 +26093,7 @@
             </a:pPr>
             <a:r>
               <a:rPr lang="en-US" sz="2000" dirty="0" err="1"/>
-              <a:t>FluentD</a:t>
+              <a:t>cAdvisor</a:t>
             </a:r>
             <a:r>
               <a:rPr lang="en-US" sz="2000" dirty="0"/>
@@ -26392,11 +26111,7 @@
             </a:pPr>
             <a:r>
               <a:rPr lang="en-US" sz="2000" dirty="0" err="1"/>
-              <a:t>Loggly</a:t>
-            </a:r>
-            <a:r>
-              <a:rPr lang="en-US" sz="2000" dirty="0"/>
-              <a:t> </a:t>
+              <a:t>InfluxDB</a:t>
             </a:r>
             <a:endParaRPr lang="en-AS" sz="2000" dirty="0"/>
           </a:p>
@@ -26409,34 +26124,8 @@
               <a:buChar char="§"/>
             </a:pPr>
             <a:r>
-              <a:rPr lang="en-US" sz="2000" dirty="0" err="1"/>
-              <a:t>Graylog</a:t>
-            </a:r>
-            <a:r>
-              <a:rPr lang="en-US" sz="2000" dirty="0"/>
-              <a:t> </a:t>
-            </a:r>
-            <a:endParaRPr lang="en-AS" sz="2000" dirty="0"/>
-          </a:p>
-          <a:p>
-            <a:pPr>
-              <a:lnSpc>
-                <a:spcPct val="100000"/>
-              </a:lnSpc>
-              <a:buFont typeface="Wingdings" panose="05000000000000000000" pitchFamily="2" charset="2"/>
-              <a:buChar char="§"/>
-            </a:pPr>
-            <a:r>
-              <a:rPr lang="en-US" sz="2000" dirty="0" err="1"/>
-              <a:t>gliderlabs</a:t>
-            </a:r>
-            <a:r>
-              <a:rPr lang="en-US" sz="2000" dirty="0"/>
-              <a:t>/</a:t>
-            </a:r>
-            <a:r>
-              <a:rPr lang="en-US" sz="2000" dirty="0" err="1"/>
-              <a:t>logspout</a:t>
+              <a:rPr lang="en-AS" sz="2000" dirty="0"/>
+              <a:t>etc.</a:t>
             </a:r>
             <a:endParaRPr lang="en-US" sz="2000" dirty="0"/>
           </a:p>
@@ -26445,7 +26134,7 @@
     </p:spTree>
     <p:extLst>
       <p:ext uri="{BB962C8B-B14F-4D97-AF65-F5344CB8AC3E}">
-        <p14:creationId xmlns:p14="http://schemas.microsoft.com/office/powerpoint/2010/main" val="1948229329"/>
+        <p14:creationId xmlns:p14="http://schemas.microsoft.com/office/powerpoint/2010/main" val="544975374"/>
       </p:ext>
     </p:extLst>
   </p:cSld>
@@ -26498,61 +26187,50 @@
                 <a:latin typeface="Source Sans Pro" panose="020B0503030403020204" pitchFamily="34" charset="0"/>
                 <a:ea typeface="Source Sans Pro" panose="020B0503030403020204" pitchFamily="34" charset="0"/>
               </a:rPr>
-              <a:t>D</a:t>
+              <a:t>L</a:t>
             </a:r>
             <a:r>
               <a:rPr lang="en-AS" sz="2400" b="1" dirty="0">
                 <a:latin typeface="Source Sans Pro" panose="020B0503030403020204" pitchFamily="34" charset="0"/>
                 <a:ea typeface="Source Sans Pro" panose="020B0503030403020204" pitchFamily="34" charset="0"/>
               </a:rPr>
-              <a:t>a</a:t>
+              <a:t>o</a:t>
             </a:r>
             <a:r>
               <a:rPr lang="en-US" sz="2400" b="1" dirty="0">
                 <a:latin typeface="Source Sans Pro" panose="020B0503030403020204" pitchFamily="34" charset="0"/>
                 <a:ea typeface="Source Sans Pro" panose="020B0503030403020204" pitchFamily="34" charset="0"/>
               </a:rPr>
-              <a:t>s</a:t>
+              <a:t>g</a:t>
             </a:r>
             <a:r>
               <a:rPr lang="en-AS" sz="2400" b="1" dirty="0">
                 <a:latin typeface="Source Sans Pro" panose="020B0503030403020204" pitchFamily="34" charset="0"/>
                 <a:ea typeface="Source Sans Pro" panose="020B0503030403020204" pitchFamily="34" charset="0"/>
               </a:rPr>
-              <a:t>h</a:t>
+              <a:t>g</a:t>
+            </a:r>
+            <a:r>
+              <a:rPr lang="en-US" sz="2400" b="1" dirty="0" err="1">
+                <a:latin typeface="Source Sans Pro" panose="020B0503030403020204" pitchFamily="34" charset="0"/>
+                <a:ea typeface="Source Sans Pro" panose="020B0503030403020204" pitchFamily="34" charset="0"/>
+              </a:rPr>
+              <a:t>i</a:t>
+            </a:r>
+            <a:r>
+              <a:rPr lang="en-AS" sz="2400" b="1" dirty="0">
+                <a:latin typeface="Source Sans Pro" panose="020B0503030403020204" pitchFamily="34" charset="0"/>
+                <a:ea typeface="Source Sans Pro" panose="020B0503030403020204" pitchFamily="34" charset="0"/>
+              </a:rPr>
+              <a:t>n</a:t>
             </a:r>
             <a:r>
               <a:rPr lang="en-US" sz="2400" b="1" dirty="0">
                 <a:latin typeface="Source Sans Pro" panose="020B0503030403020204" pitchFamily="34" charset="0"/>
                 <a:ea typeface="Source Sans Pro" panose="020B0503030403020204" pitchFamily="34" charset="0"/>
               </a:rPr>
-              <a:t>b</a:t>
-            </a:r>
-            <a:r>
-              <a:rPr lang="en-AS" sz="2400" b="1" dirty="0">
-                <a:latin typeface="Source Sans Pro" panose="020B0503030403020204" pitchFamily="34" charset="0"/>
-                <a:ea typeface="Source Sans Pro" panose="020B0503030403020204" pitchFamily="34" charset="0"/>
-              </a:rPr>
-              <a:t>o</a:t>
-            </a:r>
-            <a:r>
-              <a:rPr lang="en-US" sz="2400" b="1" dirty="0">
-                <a:latin typeface="Source Sans Pro" panose="020B0503030403020204" pitchFamily="34" charset="0"/>
-                <a:ea typeface="Source Sans Pro" panose="020B0503030403020204" pitchFamily="34" charset="0"/>
-              </a:rPr>
-              <a:t>a</a:t>
-            </a:r>
-            <a:r>
-              <a:rPr lang="en-AS" sz="2400" b="1" dirty="0" err="1">
-                <a:latin typeface="Source Sans Pro" panose="020B0503030403020204" pitchFamily="34" charset="0"/>
-                <a:ea typeface="Source Sans Pro" panose="020B0503030403020204" pitchFamily="34" charset="0"/>
-              </a:rPr>
-              <a:t>rds</a:t>
-            </a:r>
-            <a:endParaRPr lang="en-US" sz="2400" b="1" dirty="0">
-              <a:latin typeface="Source Sans Pro" panose="020B0503030403020204" pitchFamily="34" charset="0"/>
-              <a:ea typeface="Source Sans Pro" panose="020B0503030403020204" pitchFamily="34" charset="0"/>
-            </a:endParaRPr>
+              <a:t>g</a:t>
+            </a:r>
           </a:p>
         </p:txBody>
       </p:sp>
@@ -26800,22 +26478,88 @@
               <a:buChar char="§"/>
             </a:pPr>
             <a:r>
+              <a:rPr lang="en-US" sz="2000" dirty="0" err="1"/>
+              <a:t>ElasticSearch</a:t>
+            </a:r>
+            <a:r>
               <a:rPr lang="en-US" sz="2000" dirty="0"/>
-              <a:t>Grafana</a:t>
-            </a:r>
-            <a:r>
-              <a:rPr lang="en-AS" sz="2000" dirty="0"/>
-              <a:t> (</a:t>
-            </a:r>
-            <a:r>
-              <a:rPr lang="en-US" sz="2000" dirty="0">
-                <a:hlinkClick r:id="rId2"/>
-              </a:rPr>
-              <a:t>https://grafana.com/grafana/dashboards/609</a:t>
-            </a:r>
-            <a:r>
-              <a:rPr lang="en-AS" sz="2000" dirty="0"/>
-              <a:t>)</a:t>
+              <a:t>, Kibana and Logstash (ELK) </a:t>
+            </a:r>
+            <a:endParaRPr lang="en-AS" sz="2000" dirty="0"/>
+          </a:p>
+          <a:p>
+            <a:pPr>
+              <a:lnSpc>
+                <a:spcPct val="100000"/>
+              </a:lnSpc>
+              <a:buFont typeface="Wingdings" panose="05000000000000000000" pitchFamily="2" charset="2"/>
+              <a:buChar char="§"/>
+            </a:pPr>
+            <a:r>
+              <a:rPr lang="en-US" sz="2000" dirty="0" err="1"/>
+              <a:t>FluentD</a:t>
+            </a:r>
+            <a:r>
+              <a:rPr lang="en-US" sz="2000" dirty="0"/>
+              <a:t> </a:t>
+            </a:r>
+            <a:endParaRPr lang="en-AS" sz="2000" dirty="0"/>
+          </a:p>
+          <a:p>
+            <a:pPr>
+              <a:lnSpc>
+                <a:spcPct val="100000"/>
+              </a:lnSpc>
+              <a:buFont typeface="Wingdings" panose="05000000000000000000" pitchFamily="2" charset="2"/>
+              <a:buChar char="§"/>
+            </a:pPr>
+            <a:r>
+              <a:rPr lang="en-US" sz="2000" dirty="0" err="1"/>
+              <a:t>Loggly</a:t>
+            </a:r>
+            <a:r>
+              <a:rPr lang="en-US" sz="2000" dirty="0"/>
+              <a:t> </a:t>
+            </a:r>
+            <a:endParaRPr lang="en-AS" sz="2000" dirty="0"/>
+          </a:p>
+          <a:p>
+            <a:pPr>
+              <a:lnSpc>
+                <a:spcPct val="100000"/>
+              </a:lnSpc>
+              <a:buFont typeface="Wingdings" panose="05000000000000000000" pitchFamily="2" charset="2"/>
+              <a:buChar char="§"/>
+            </a:pPr>
+            <a:r>
+              <a:rPr lang="en-US" sz="2000" dirty="0" err="1"/>
+              <a:t>Graylog</a:t>
+            </a:r>
+            <a:r>
+              <a:rPr lang="en-US" sz="2000" dirty="0"/>
+              <a:t> </a:t>
+            </a:r>
+            <a:endParaRPr lang="en-AS" sz="2000" dirty="0"/>
+          </a:p>
+          <a:p>
+            <a:pPr>
+              <a:lnSpc>
+                <a:spcPct val="100000"/>
+              </a:lnSpc>
+              <a:buFont typeface="Wingdings" panose="05000000000000000000" pitchFamily="2" charset="2"/>
+              <a:buChar char="§"/>
+            </a:pPr>
+            <a:r>
+              <a:rPr lang="en-US" sz="2000" dirty="0" err="1"/>
+              <a:t>gliderlabs</a:t>
+            </a:r>
+            <a:r>
+              <a:rPr lang="en-US" sz="2000" dirty="0"/>
+              <a:t>/</a:t>
+            </a:r>
+            <a:r>
+              <a:rPr lang="en-US" sz="2000" dirty="0" err="1"/>
+              <a:t>logspout</a:t>
             </a:r>
             <a:endParaRPr lang="en-US" sz="2000" dirty="0"/>
           </a:p>
@@ -26824,7 +26568,7 @@
     </p:spTree>
     <p:extLst>
       <p:ext uri="{BB962C8B-B14F-4D97-AF65-F5344CB8AC3E}">
-        <p14:creationId xmlns:p14="http://schemas.microsoft.com/office/powerpoint/2010/main" val="1415678444"/>
+        <p14:creationId xmlns:p14="http://schemas.microsoft.com/office/powerpoint/2010/main" val="1948229329"/>
       </p:ext>
     </p:extLst>
   </p:cSld>
@@ -26873,11 +26617,60 @@
           <a:lstStyle/>
           <a:p>
             <a:r>
+              <a:rPr lang="en-US" sz="2400" b="1" dirty="0">
+                <a:latin typeface="Source Sans Pro" panose="020B0503030403020204" pitchFamily="34" charset="0"/>
+                <a:ea typeface="Source Sans Pro" panose="020B0503030403020204" pitchFamily="34" charset="0"/>
+              </a:rPr>
+              <a:t>D</a:t>
+            </a:r>
+            <a:r>
               <a:rPr lang="en-AS" sz="2400" b="1" dirty="0">
                 <a:latin typeface="Source Sans Pro" panose="020B0503030403020204" pitchFamily="34" charset="0"/>
                 <a:ea typeface="Source Sans Pro" panose="020B0503030403020204" pitchFamily="34" charset="0"/>
               </a:rPr>
-              <a:t>Book</a:t>
+              <a:t>a</a:t>
+            </a:r>
+            <a:r>
+              <a:rPr lang="en-US" sz="2400" b="1" dirty="0">
+                <a:latin typeface="Source Sans Pro" panose="020B0503030403020204" pitchFamily="34" charset="0"/>
+                <a:ea typeface="Source Sans Pro" panose="020B0503030403020204" pitchFamily="34" charset="0"/>
+              </a:rPr>
+              <a:t>s</a:t>
+            </a:r>
+            <a:r>
+              <a:rPr lang="en-AS" sz="2400" b="1" dirty="0">
+                <a:latin typeface="Source Sans Pro" panose="020B0503030403020204" pitchFamily="34" charset="0"/>
+                <a:ea typeface="Source Sans Pro" panose="020B0503030403020204" pitchFamily="34" charset="0"/>
+              </a:rPr>
+              <a:t>h</a:t>
+            </a:r>
+            <a:r>
+              <a:rPr lang="en-US" sz="2400" b="1" dirty="0">
+                <a:latin typeface="Source Sans Pro" panose="020B0503030403020204" pitchFamily="34" charset="0"/>
+                <a:ea typeface="Source Sans Pro" panose="020B0503030403020204" pitchFamily="34" charset="0"/>
+              </a:rPr>
+              <a:t>b</a:t>
+            </a:r>
+            <a:r>
+              <a:rPr lang="en-AS" sz="2400" b="1" dirty="0">
+                <a:latin typeface="Source Sans Pro" panose="020B0503030403020204" pitchFamily="34" charset="0"/>
+                <a:ea typeface="Source Sans Pro" panose="020B0503030403020204" pitchFamily="34" charset="0"/>
+              </a:rPr>
+              <a:t>o</a:t>
+            </a:r>
+            <a:r>
+              <a:rPr lang="en-US" sz="2400" b="1" dirty="0">
+                <a:latin typeface="Source Sans Pro" panose="020B0503030403020204" pitchFamily="34" charset="0"/>
+                <a:ea typeface="Source Sans Pro" panose="020B0503030403020204" pitchFamily="34" charset="0"/>
+              </a:rPr>
+              <a:t>a</a:t>
+            </a:r>
+            <a:r>
+              <a:rPr lang="en-AS" sz="2400" b="1" dirty="0" err="1">
+                <a:latin typeface="Source Sans Pro" panose="020B0503030403020204" pitchFamily="34" charset="0"/>
+                <a:ea typeface="Source Sans Pro" panose="020B0503030403020204" pitchFamily="34" charset="0"/>
+              </a:rPr>
+              <a:t>rds</a:t>
             </a:r>
             <a:endParaRPr lang="en-US" sz="2400" b="1" dirty="0">
               <a:latin typeface="Source Sans Pro" panose="020B0503030403020204" pitchFamily="34" charset="0"/>
@@ -27119,93 +26912,42 @@
                 <a:spcPct val="100000"/>
               </a:lnSpc>
             </a:pPr>
+            <a:endParaRPr lang="en-AS" sz="2000" dirty="0"/>
+          </a:p>
+          <a:p>
+            <a:pPr>
+              <a:lnSpc>
+                <a:spcPct val="100000"/>
+              </a:lnSpc>
+              <a:buFont typeface="Wingdings" panose="05000000000000000000" pitchFamily="2" charset="2"/>
+              <a:buChar char="§"/>
+            </a:pPr>
             <a:r>
               <a:rPr lang="en-US" sz="2000" dirty="0"/>
-              <a:t>T</a:t>
+              <a:t>Grafana</a:t>
             </a:r>
             <a:r>
               <a:rPr lang="en-AS" sz="2000" dirty="0"/>
-              <a:t>h</a:t>
-            </a:r>
-            <a:r>
-              <a:rPr lang="en-US" sz="2000" dirty="0"/>
-              <a:t>e</a:t>
+              <a:t> (</a:t>
+            </a:r>
+            <a:r>
+              <a:rPr lang="en-US" sz="2000" dirty="0">
+                <a:hlinkClick r:id="rId2"/>
+              </a:rPr>
+              <a:t>https://grafana.com/grafana/dashboards/609</a:t>
             </a:r>
             <a:r>
               <a:rPr lang="en-AS" sz="2000" dirty="0"/>
-              <a:t> </a:t>
-            </a:r>
-            <a:r>
-              <a:rPr lang="en-US" sz="2000" dirty="0"/>
-              <a:t>D</a:t>
-            </a:r>
-            <a:r>
-              <a:rPr lang="en-AS" sz="2000" dirty="0"/>
-              <a:t>e</a:t>
-            </a:r>
-            <a:r>
-              <a:rPr lang="en-US" sz="2000" dirty="0"/>
-              <a:t>v</a:t>
-            </a:r>
-            <a:r>
-              <a:rPr lang="en-AS" sz="2000" dirty="0"/>
-              <a:t>Ops 2.1 Toolkit</a:t>
+              <a:t>)</a:t>
             </a:r>
             <a:endParaRPr lang="en-US" sz="2000" dirty="0"/>
           </a:p>
         </p:txBody>
       </p:sp>
-      <p:pic>
-        <p:nvPicPr>
-          <p:cNvPr id="11266" name="Picture 2" descr="Image result for the devops toolkit book">
-            <a:extLst>
-              <a:ext uri="{FF2B5EF4-FFF2-40B4-BE49-F238E27FC236}">
-                <a16:creationId xmlns:a16="http://schemas.microsoft.com/office/drawing/2014/main" id="{4CAA243D-9FC1-49CE-BF7D-51C08B9732CD}"/>
-              </a:ext>
-            </a:extLst>
-          </p:cNvPr>
-          <p:cNvPicPr>
-            <a:picLocks noChangeAspect="1" noChangeArrowheads="1"/>
-          </p:cNvPicPr>
-          <p:nvPr/>
-        </p:nvPicPr>
-        <p:blipFill>
-          <a:blip r:embed="rId2">
-            <a:extLst>
-              <a:ext uri="{28A0092B-C50C-407E-A947-70E740481C1C}">
-                <a14:useLocalDpi xmlns:a14="http://schemas.microsoft.com/office/drawing/2010/main" val="0"/>
-              </a:ext>
-            </a:extLst>
-          </a:blip>
-          <a:srcRect/>
-          <a:stretch>
-            <a:fillRect/>
-          </a:stretch>
-        </p:blipFill>
-        <p:spPr bwMode="auto">
-          <a:xfrm>
-            <a:off x="5269653" y="733552"/>
-            <a:ext cx="3157872" cy="4093087"/>
-          </a:xfrm>
-          <a:prstGeom prst="rect">
-            <a:avLst/>
-          </a:prstGeom>
-          <a:noFill/>
-          <a:extLst>
-            <a:ext uri="{909E8E84-426E-40DD-AFC4-6F175D3DCCD1}">
-              <a14:hiddenFill xmlns:a14="http://schemas.microsoft.com/office/drawing/2010/main">
-                <a:solidFill>
-                  <a:srgbClr val="FFFFFF"/>
-                </a:solidFill>
-              </a14:hiddenFill>
-            </a:ext>
-          </a:extLst>
-        </p:spPr>
-      </p:pic>
     </p:spTree>
     <p:extLst>
       <p:ext uri="{BB962C8B-B14F-4D97-AF65-F5344CB8AC3E}">
-        <p14:creationId xmlns:p14="http://schemas.microsoft.com/office/powerpoint/2010/main" val="2669253921"/>
+        <p14:creationId xmlns:p14="http://schemas.microsoft.com/office/powerpoint/2010/main" val="1415678444"/>
       </p:ext>
     </p:extLst>
   </p:cSld>
@@ -27254,46 +26996,11 @@
           <a:lstStyle/>
           <a:p>
             <a:r>
-              <a:rPr lang="en-US" sz="2400" b="1" dirty="0">
-                <a:latin typeface="Source Sans Pro" panose="020B0503030403020204" pitchFamily="34" charset="0"/>
-                <a:ea typeface="Source Sans Pro" panose="020B0503030403020204" pitchFamily="34" charset="0"/>
-              </a:rPr>
-              <a:t>Q</a:t>
-            </a:r>
-            <a:r>
               <a:rPr lang="en-AS" sz="2400" b="1" dirty="0">
                 <a:latin typeface="Source Sans Pro" panose="020B0503030403020204" pitchFamily="34" charset="0"/>
                 <a:ea typeface="Source Sans Pro" panose="020B0503030403020204" pitchFamily="34" charset="0"/>
               </a:rPr>
-              <a:t>u</a:t>
-            </a:r>
-            <a:r>
-              <a:rPr lang="en-US" sz="2400" b="1" dirty="0">
-                <a:latin typeface="Source Sans Pro" panose="020B0503030403020204" pitchFamily="34" charset="0"/>
-                <a:ea typeface="Source Sans Pro" panose="020B0503030403020204" pitchFamily="34" charset="0"/>
-              </a:rPr>
-              <a:t>e</a:t>
-            </a:r>
-            <a:r>
-              <a:rPr lang="en-AS" sz="2400" b="1" dirty="0">
-                <a:latin typeface="Source Sans Pro" panose="020B0503030403020204" pitchFamily="34" charset="0"/>
-                <a:ea typeface="Source Sans Pro" panose="020B0503030403020204" pitchFamily="34" charset="0"/>
-              </a:rPr>
-              <a:t>s</a:t>
-            </a:r>
-            <a:r>
-              <a:rPr lang="en-US" sz="2400" b="1" dirty="0">
-                <a:latin typeface="Source Sans Pro" panose="020B0503030403020204" pitchFamily="34" charset="0"/>
-                <a:ea typeface="Source Sans Pro" panose="020B0503030403020204" pitchFamily="34" charset="0"/>
-              </a:rPr>
-              <a:t>t</a:t>
-            </a:r>
-            <a:r>
-              <a:rPr lang="en-AS" sz="2400" b="1" dirty="0">
-                <a:latin typeface="Source Sans Pro" panose="020B0503030403020204" pitchFamily="34" charset="0"/>
-                <a:ea typeface="Source Sans Pro" panose="020B0503030403020204" pitchFamily="34" charset="0"/>
-              </a:rPr>
-              <a:t>ions?</a:t>
+              <a:t>Book</a:t>
             </a:r>
             <a:endParaRPr lang="en-US" sz="2400" b="1" dirty="0">
               <a:latin typeface="Source Sans Pro" panose="020B0503030403020204" pitchFamily="34" charset="0"/>
@@ -27530,6 +27237,422 @@
             </a:lvl9pPr>
           </a:lstStyle>
           <a:p>
+            <a:pPr>
+              <a:lnSpc>
+                <a:spcPct val="100000"/>
+              </a:lnSpc>
+            </a:pPr>
+            <a:r>
+              <a:rPr lang="en-US" sz="2000" dirty="0"/>
+              <a:t>T</a:t>
+            </a:r>
+            <a:r>
+              <a:rPr lang="en-AS" sz="2000" dirty="0"/>
+              <a:t>h</a:t>
+            </a:r>
+            <a:r>
+              <a:rPr lang="en-US" sz="2000" dirty="0"/>
+              <a:t>e</a:t>
+            </a:r>
+            <a:r>
+              <a:rPr lang="en-AS" sz="2000" dirty="0"/>
+              <a:t> </a:t>
+            </a:r>
+            <a:r>
+              <a:rPr lang="en-US" sz="2000" dirty="0"/>
+              <a:t>D</a:t>
+            </a:r>
+            <a:r>
+              <a:rPr lang="en-AS" sz="2000" dirty="0"/>
+              <a:t>e</a:t>
+            </a:r>
+            <a:r>
+              <a:rPr lang="en-US" sz="2000" dirty="0"/>
+              <a:t>v</a:t>
+            </a:r>
+            <a:r>
+              <a:rPr lang="en-AS" sz="2000" dirty="0"/>
+              <a:t>Ops 2.1 Toolkit</a:t>
+            </a:r>
+            <a:endParaRPr lang="en-US" sz="2000" dirty="0"/>
+          </a:p>
+        </p:txBody>
+      </p:sp>
+      <p:pic>
+        <p:nvPicPr>
+          <p:cNvPr id="11266" name="Picture 2" descr="Image result for the devops toolkit book">
+            <a:extLst>
+              <a:ext uri="{FF2B5EF4-FFF2-40B4-BE49-F238E27FC236}">
+                <a16:creationId xmlns:a16="http://schemas.microsoft.com/office/drawing/2014/main" id="{4CAA243D-9FC1-49CE-BF7D-51C08B9732CD}"/>
+              </a:ext>
+            </a:extLst>
+          </p:cNvPr>
+          <p:cNvPicPr>
+            <a:picLocks noChangeAspect="1" noChangeArrowheads="1"/>
+          </p:cNvPicPr>
+          <p:nvPr/>
+        </p:nvPicPr>
+        <p:blipFill>
+          <a:blip r:embed="rId2">
+            <a:extLst>
+              <a:ext uri="{28A0092B-C50C-407E-A947-70E740481C1C}">
+                <a14:useLocalDpi xmlns:a14="http://schemas.microsoft.com/office/drawing/2010/main" val="0"/>
+              </a:ext>
+            </a:extLst>
+          </a:blip>
+          <a:srcRect/>
+          <a:stretch>
+            <a:fillRect/>
+          </a:stretch>
+        </p:blipFill>
+        <p:spPr bwMode="auto">
+          <a:xfrm>
+            <a:off x="5269653" y="733552"/>
+            <a:ext cx="3157872" cy="4093087"/>
+          </a:xfrm>
+          <a:prstGeom prst="rect">
+            <a:avLst/>
+          </a:prstGeom>
+          <a:noFill/>
+          <a:extLst>
+            <a:ext uri="{909E8E84-426E-40DD-AFC4-6F175D3DCCD1}">
+              <a14:hiddenFill xmlns:a14="http://schemas.microsoft.com/office/drawing/2010/main">
+                <a:solidFill>
+                  <a:srgbClr val="FFFFFF"/>
+                </a:solidFill>
+              </a14:hiddenFill>
+            </a:ext>
+          </a:extLst>
+        </p:spPr>
+      </p:pic>
+    </p:spTree>
+    <p:extLst>
+      <p:ext uri="{BB962C8B-B14F-4D97-AF65-F5344CB8AC3E}">
+        <p14:creationId xmlns:p14="http://schemas.microsoft.com/office/powerpoint/2010/main" val="2669253921"/>
+      </p:ext>
+    </p:extLst>
+  </p:cSld>
+  <p:clrMapOvr>
+    <a:masterClrMapping/>
+  </p:clrMapOvr>
+</p:sld>
+</file>
+
+<file path=ppt/slides/slide34.xml><?xml version="1.0" encoding="utf-8"?>
+<p:sld xmlns:a="http://schemas.openxmlformats.org/drawingml/2006/main" xmlns:r="http://schemas.openxmlformats.org/officeDocument/2006/relationships" xmlns:p="http://schemas.openxmlformats.org/presentationml/2006/main">
+  <p:cSld>
+    <p:spTree>
+      <p:nvGrpSpPr>
+        <p:cNvPr id="1" name=""/>
+        <p:cNvGrpSpPr/>
+        <p:nvPr/>
+      </p:nvGrpSpPr>
+      <p:grpSpPr>
+        <a:xfrm>
+          <a:off x="0" y="0"/>
+          <a:ext cx="0" cy="0"/>
+          <a:chOff x="0" y="0"/>
+          <a:chExt cx="0" cy="0"/>
+        </a:xfrm>
+      </p:grpSpPr>
+      <p:sp>
+        <p:nvSpPr>
+          <p:cNvPr id="6" name="Title 5">
+            <a:extLst>
+              <a:ext uri="{FF2B5EF4-FFF2-40B4-BE49-F238E27FC236}">
+                <a16:creationId xmlns:a16="http://schemas.microsoft.com/office/drawing/2014/main" id="{C1E31384-3A69-F844-B4E8-8047057EAEC8}"/>
+              </a:ext>
+            </a:extLst>
+          </p:cNvPr>
+          <p:cNvSpPr>
+            <a:spLocks noGrp="1"/>
+          </p:cNvSpPr>
+          <p:nvPr>
+            <p:ph type="title"/>
+          </p:nvPr>
+        </p:nvSpPr>
+        <p:spPr/>
+        <p:txBody>
+          <a:bodyPr/>
+          <a:lstStyle/>
+          <a:p>
+            <a:r>
+              <a:rPr lang="en-US" sz="2400" b="1" dirty="0">
+                <a:latin typeface="Source Sans Pro" panose="020B0503030403020204" pitchFamily="34" charset="0"/>
+                <a:ea typeface="Source Sans Pro" panose="020B0503030403020204" pitchFamily="34" charset="0"/>
+              </a:rPr>
+              <a:t>Q</a:t>
+            </a:r>
+            <a:r>
+              <a:rPr lang="en-AS" sz="2400" b="1" dirty="0">
+                <a:latin typeface="Source Sans Pro" panose="020B0503030403020204" pitchFamily="34" charset="0"/>
+                <a:ea typeface="Source Sans Pro" panose="020B0503030403020204" pitchFamily="34" charset="0"/>
+              </a:rPr>
+              <a:t>u</a:t>
+            </a:r>
+            <a:r>
+              <a:rPr lang="en-US" sz="2400" b="1" dirty="0">
+                <a:latin typeface="Source Sans Pro" panose="020B0503030403020204" pitchFamily="34" charset="0"/>
+                <a:ea typeface="Source Sans Pro" panose="020B0503030403020204" pitchFamily="34" charset="0"/>
+              </a:rPr>
+              <a:t>e</a:t>
+            </a:r>
+            <a:r>
+              <a:rPr lang="en-AS" sz="2400" b="1" dirty="0">
+                <a:latin typeface="Source Sans Pro" panose="020B0503030403020204" pitchFamily="34" charset="0"/>
+                <a:ea typeface="Source Sans Pro" panose="020B0503030403020204" pitchFamily="34" charset="0"/>
+              </a:rPr>
+              <a:t>s</a:t>
+            </a:r>
+            <a:r>
+              <a:rPr lang="en-US" sz="2400" b="1" dirty="0">
+                <a:latin typeface="Source Sans Pro" panose="020B0503030403020204" pitchFamily="34" charset="0"/>
+                <a:ea typeface="Source Sans Pro" panose="020B0503030403020204" pitchFamily="34" charset="0"/>
+              </a:rPr>
+              <a:t>t</a:t>
+            </a:r>
+            <a:r>
+              <a:rPr lang="en-AS" sz="2400" b="1" dirty="0">
+                <a:latin typeface="Source Sans Pro" panose="020B0503030403020204" pitchFamily="34" charset="0"/>
+                <a:ea typeface="Source Sans Pro" panose="020B0503030403020204" pitchFamily="34" charset="0"/>
+              </a:rPr>
+              <a:t>ions?</a:t>
+            </a:r>
+            <a:endParaRPr lang="en-US" sz="2400" b="1" dirty="0">
+              <a:latin typeface="Source Sans Pro" panose="020B0503030403020204" pitchFamily="34" charset="0"/>
+              <a:ea typeface="Source Sans Pro" panose="020B0503030403020204" pitchFamily="34" charset="0"/>
+            </a:endParaRPr>
+          </a:p>
+        </p:txBody>
+      </p:sp>
+      <p:sp>
+        <p:nvSpPr>
+          <p:cNvPr id="5" name="Slide Number Placeholder 4">
+            <a:extLst>
+              <a:ext uri="{FF2B5EF4-FFF2-40B4-BE49-F238E27FC236}">
+                <a16:creationId xmlns:a16="http://schemas.microsoft.com/office/drawing/2014/main" id="{D695E08B-236F-5B4F-801C-4C75369E005C}"/>
+              </a:ext>
+            </a:extLst>
+          </p:cNvPr>
+          <p:cNvSpPr>
+            <a:spLocks noGrp="1"/>
+          </p:cNvSpPr>
+          <p:nvPr>
+            <p:ph type="sldNum" sz="quarter" idx="4"/>
+          </p:nvPr>
+        </p:nvSpPr>
+        <p:spPr/>
+        <p:txBody>
+          <a:bodyPr/>
+          <a:lstStyle/>
+          <a:p>
+            <a:fld id="{3A707DD9-E92B-45E8-BE0A-E6B2EDF345EB}" type="slidenum">
+              <a:rPr lang="en-US" smtClean="0"/>
+              <a:pPr/>
+              <a:t>34</a:t>
+            </a:fld>
+            <a:endParaRPr lang="en-US" dirty="0"/>
+          </a:p>
+        </p:txBody>
+      </p:sp>
+      <p:sp>
+        <p:nvSpPr>
+          <p:cNvPr id="10" name="Content Placeholder 2">
+            <a:extLst>
+              <a:ext uri="{FF2B5EF4-FFF2-40B4-BE49-F238E27FC236}">
+                <a16:creationId xmlns:a16="http://schemas.microsoft.com/office/drawing/2014/main" id="{5D0C82FB-7C2C-47FB-8BCD-E5CDCDE9FC17}"/>
+              </a:ext>
+            </a:extLst>
+          </p:cNvPr>
+          <p:cNvSpPr txBox="1">
+            <a:spLocks/>
+          </p:cNvSpPr>
+          <p:nvPr/>
+        </p:nvSpPr>
+        <p:spPr>
+          <a:xfrm>
+            <a:off x="261400" y="822324"/>
+            <a:ext cx="8733587" cy="3801115"/>
+          </a:xfrm>
+          <a:prstGeom prst="rect">
+            <a:avLst/>
+          </a:prstGeom>
+        </p:spPr>
+        <p:txBody>
+          <a:bodyPr vert="horz" lIns="0" tIns="0" rIns="0" bIns="0" rtlCol="0">
+            <a:noAutofit/>
+          </a:bodyPr>
+          <a:lstStyle>
+            <a:lvl1pPr marL="171450" marR="0" indent="-171450" algn="l" defTabSz="914400" rtl="0" eaLnBrk="1" fontAlgn="auto" latinLnBrk="0" hangingPunct="1">
+              <a:lnSpc>
+                <a:spcPts val="1600"/>
+              </a:lnSpc>
+              <a:spcBef>
+                <a:spcPts val="264"/>
+              </a:spcBef>
+              <a:spcAft>
+                <a:spcPts val="300"/>
+              </a:spcAft>
+              <a:buClrTx/>
+              <a:buSzTx/>
+              <a:buFont typeface="Arial" panose="020B0604020202020204" pitchFamily="34" charset="0"/>
+              <a:buChar char="•"/>
+              <a:tabLst/>
+              <a:defRPr sz="1100" kern="1200">
+                <a:solidFill>
+                  <a:schemeClr val="tx1"/>
+                </a:solidFill>
+                <a:latin typeface="+mj-lt"/>
+                <a:ea typeface="+mn-ea"/>
+                <a:cs typeface="+mn-cs"/>
+              </a:defRPr>
+            </a:lvl1pPr>
+            <a:lvl2pPr marL="628650" indent="-171450" algn="l" defTabSz="914400" rtl="0" eaLnBrk="1" latinLnBrk="0" hangingPunct="1">
+              <a:lnSpc>
+                <a:spcPct val="90000"/>
+              </a:lnSpc>
+              <a:spcBef>
+                <a:spcPts val="500"/>
+              </a:spcBef>
+              <a:buFont typeface="Arial" panose="020B0604020202020204" pitchFamily="34" charset="0"/>
+              <a:buChar char="•"/>
+              <a:defRPr sz="1100" kern="1200">
+                <a:solidFill>
+                  <a:schemeClr val="tx1"/>
+                </a:solidFill>
+                <a:latin typeface="+mn-lt"/>
+                <a:ea typeface="+mn-ea"/>
+                <a:cs typeface="+mn-cs"/>
+              </a:defRPr>
+            </a:lvl2pPr>
+            <a:lvl3pPr marL="1085850" indent="-171450" algn="l" defTabSz="914400" rtl="0" eaLnBrk="1" latinLnBrk="0" hangingPunct="1">
+              <a:lnSpc>
+                <a:spcPct val="90000"/>
+              </a:lnSpc>
+              <a:spcBef>
+                <a:spcPts val="500"/>
+              </a:spcBef>
+              <a:buFont typeface="Arial" panose="020B0604020202020204" pitchFamily="34" charset="0"/>
+              <a:buChar char="•"/>
+              <a:defRPr sz="1100" kern="1200">
+                <a:solidFill>
+                  <a:schemeClr val="tx1"/>
+                </a:solidFill>
+                <a:latin typeface="+mn-lt"/>
+                <a:ea typeface="+mn-ea"/>
+                <a:cs typeface="+mn-cs"/>
+              </a:defRPr>
+            </a:lvl3pPr>
+            <a:lvl4pPr marL="1657350" indent="-285750" algn="l" defTabSz="914400" rtl="0" eaLnBrk="1" latinLnBrk="0" hangingPunct="1">
+              <a:lnSpc>
+                <a:spcPct val="90000"/>
+              </a:lnSpc>
+              <a:spcBef>
+                <a:spcPts val="500"/>
+              </a:spcBef>
+              <a:buFont typeface="Arial" panose="020B0604020202020204" pitchFamily="34" charset="0"/>
+              <a:buChar char="•"/>
+              <a:defRPr sz="1100" kern="1200">
+                <a:solidFill>
+                  <a:schemeClr val="tx1"/>
+                </a:solidFill>
+                <a:latin typeface="+mn-lt"/>
+                <a:ea typeface="+mn-ea"/>
+                <a:cs typeface="+mn-cs"/>
+              </a:defRPr>
+            </a:lvl4pPr>
+            <a:lvl5pPr marL="1828800" indent="0" algn="l" defTabSz="914400" rtl="0" eaLnBrk="1" latinLnBrk="0" hangingPunct="1">
+              <a:lnSpc>
+                <a:spcPct val="90000"/>
+              </a:lnSpc>
+              <a:spcBef>
+                <a:spcPts val="500"/>
+              </a:spcBef>
+              <a:buFont typeface="Arial" panose="020B0604020202020204" pitchFamily="34" charset="0"/>
+              <a:buNone/>
+              <a:defRPr sz="1800" kern="1200">
+                <a:solidFill>
+                  <a:schemeClr val="tx1"/>
+                </a:solidFill>
+                <a:latin typeface="+mn-lt"/>
+                <a:ea typeface="+mn-ea"/>
+                <a:cs typeface="+mn-cs"/>
+              </a:defRPr>
+            </a:lvl5pPr>
+            <a:lvl6pPr marL="2514600" indent="-228600" algn="l" defTabSz="914400" rtl="0" eaLnBrk="1" latinLnBrk="0" hangingPunct="1">
+              <a:lnSpc>
+                <a:spcPct val="90000"/>
+              </a:lnSpc>
+              <a:spcBef>
+                <a:spcPts val="500"/>
+              </a:spcBef>
+              <a:buFont typeface="Arial" panose="020B0604020202020204" pitchFamily="34" charset="0"/>
+              <a:buChar char="•"/>
+              <a:defRPr sz="1800" kern="1200">
+                <a:solidFill>
+                  <a:schemeClr val="tx1"/>
+                </a:solidFill>
+                <a:latin typeface="+mn-lt"/>
+                <a:ea typeface="+mn-ea"/>
+                <a:cs typeface="+mn-cs"/>
+              </a:defRPr>
+            </a:lvl6pPr>
+            <a:lvl7pPr marL="2971800" indent="-228600" algn="l" defTabSz="914400" rtl="0" eaLnBrk="1" latinLnBrk="0" hangingPunct="1">
+              <a:lnSpc>
+                <a:spcPct val="90000"/>
+              </a:lnSpc>
+              <a:spcBef>
+                <a:spcPts val="500"/>
+              </a:spcBef>
+              <a:buFont typeface="Arial" panose="020B0604020202020204" pitchFamily="34" charset="0"/>
+              <a:buChar char="•"/>
+              <a:defRPr sz="1800" kern="1200">
+                <a:solidFill>
+                  <a:schemeClr val="tx1"/>
+                </a:solidFill>
+                <a:latin typeface="+mn-lt"/>
+                <a:ea typeface="+mn-ea"/>
+                <a:cs typeface="+mn-cs"/>
+              </a:defRPr>
+            </a:lvl7pPr>
+            <a:lvl8pPr marL="3429000" indent="-228600" algn="l" defTabSz="914400" rtl="0" eaLnBrk="1" latinLnBrk="0" hangingPunct="1">
+              <a:lnSpc>
+                <a:spcPct val="90000"/>
+              </a:lnSpc>
+              <a:spcBef>
+                <a:spcPts val="500"/>
+              </a:spcBef>
+              <a:buFont typeface="Arial" panose="020B0604020202020204" pitchFamily="34" charset="0"/>
+              <a:buChar char="•"/>
+              <a:defRPr sz="1800" kern="1200">
+                <a:solidFill>
+                  <a:schemeClr val="tx1"/>
+                </a:solidFill>
+                <a:latin typeface="+mn-lt"/>
+                <a:ea typeface="+mn-ea"/>
+                <a:cs typeface="+mn-cs"/>
+              </a:defRPr>
+            </a:lvl8pPr>
+            <a:lvl9pPr marL="3886200" indent="-228600" algn="l" defTabSz="914400" rtl="0" eaLnBrk="1" latinLnBrk="0" hangingPunct="1">
+              <a:lnSpc>
+                <a:spcPct val="90000"/>
+              </a:lnSpc>
+              <a:spcBef>
+                <a:spcPts val="500"/>
+              </a:spcBef>
+              <a:buFont typeface="Arial" panose="020B0604020202020204" pitchFamily="34" charset="0"/>
+              <a:buChar char="•"/>
+              <a:defRPr sz="1800" kern="1200">
+                <a:solidFill>
+                  <a:schemeClr val="tx1"/>
+                </a:solidFill>
+                <a:latin typeface="+mn-lt"/>
+                <a:ea typeface="+mn-ea"/>
+                <a:cs typeface="+mn-cs"/>
+              </a:defRPr>
+            </a:lvl9pPr>
+          </a:lstStyle>
+          <a:p>
             <a:pPr marL="0" indent="0">
               <a:lnSpc>
                 <a:spcPct val="100000"/>
@@ -27722,7 +27845,7 @@
 </p:sld>
 </file>
 
-<file path=ppt/slides/slide34.xml><?xml version="1.0" encoding="utf-8"?>
+<file path=ppt/slides/slide35.xml><?xml version="1.0" encoding="utf-8"?>
 <p:sld xmlns:a="http://schemas.openxmlformats.org/drawingml/2006/main" xmlns:r="http://schemas.openxmlformats.org/officeDocument/2006/relationships" xmlns:p="http://schemas.openxmlformats.org/presentationml/2006/main">
   <p:cSld>
     <p:spTree>
@@ -27910,7 +28033,7 @@
             <a:fld id="{3A707DD9-E92B-45E8-BE0A-E6B2EDF345EB}" type="slidenum">
               <a:rPr lang="en-US" smtClean="0"/>
               <a:pPr/>
-              <a:t>34</a:t>
+              <a:t>35</a:t>
             </a:fld>
             <a:endParaRPr lang="en-US" dirty="0"/>
           </a:p>

</xml_diff>